<commit_message>
Aula 07 Microcontroladores ajuste 17maio2023
</commit_message>
<xml_diff>
--- a/01 Classes/Aula 07 - Programação Microcontroladores - Periféricos Externos- Protocolos Sensores e Atuadores.pptx
+++ b/01 Classes/Aula 07 - Programação Microcontroladores - Periféricos Externos- Protocolos Sensores e Atuadores.pptx
@@ -10702,12 +10702,20 @@
               <a:t>	</a:t>
             </a:r>
             <a:r>
+              <a:rPr lang="pt-BR" sz="3600" b="1">
+                <a:solidFill>
+                  <a:schemeClr val="bg1"/>
+                </a:solidFill>
+              </a:rPr>
+              <a:t>Periféricos – </a:t>
+            </a:r>
+            <a:r>
               <a:rPr lang="pt-BR" sz="3600" b="1" dirty="0">
                 <a:solidFill>
                   <a:schemeClr val="bg1"/>
                 </a:solidFill>
               </a:rPr>
-              <a:t>Periféricos Externos – Sensores e Atuadores</a:t>
+              <a:t>Sensores e Atuadores</a:t>
             </a:r>
           </a:p>
         </p:txBody>

</xml_diff>

<commit_message>
Aulas 08, 09 e 10 Microcontroladorers 23maio2023
</commit_message>
<xml_diff>
--- a/01 Classes/Aula 07 - Programação Microcontroladores - Periféricos Externos- Protocolos Sensores e Atuadores.pptx
+++ b/01 Classes/Aula 07 - Programação Microcontroladores - Periféricos Externos- Protocolos Sensores e Atuadores.pptx
@@ -2,55 +2,55 @@
 <file path=ppt/presentation.xml><?xml version="1.0" encoding="utf-8"?>
 <p:presentation xmlns:a="http://schemas.openxmlformats.org/drawingml/2006/main" xmlns:r="http://schemas.openxmlformats.org/officeDocument/2006/relationships" xmlns:p="http://schemas.openxmlformats.org/presentationml/2006/main">
   <p:sldMasterIdLst>
-    <p:sldMasterId id="2147483648" r:id="rId1"/>
+    <p:sldMasterId id="2147483648" r:id="rId4"/>
   </p:sldMasterIdLst>
   <p:notesMasterIdLst>
-    <p:notesMasterId r:id="rId45"/>
+    <p:notesMasterId r:id="rId48"/>
   </p:notesMasterIdLst>
   <p:sldIdLst>
-    <p:sldId id="256" r:id="rId2"/>
-    <p:sldId id="291" r:id="rId3"/>
-    <p:sldId id="340" r:id="rId4"/>
-    <p:sldId id="344" r:id="rId5"/>
-    <p:sldId id="350" r:id="rId6"/>
-    <p:sldId id="351" r:id="rId7"/>
-    <p:sldId id="352" r:id="rId8"/>
-    <p:sldId id="353" r:id="rId9"/>
-    <p:sldId id="354" r:id="rId10"/>
-    <p:sldId id="355" r:id="rId11"/>
-    <p:sldId id="356" r:id="rId12"/>
-    <p:sldId id="357" r:id="rId13"/>
-    <p:sldId id="358" r:id="rId14"/>
-    <p:sldId id="343" r:id="rId15"/>
-    <p:sldId id="362" r:id="rId16"/>
-    <p:sldId id="347" r:id="rId17"/>
-    <p:sldId id="348" r:id="rId18"/>
-    <p:sldId id="349" r:id="rId19"/>
-    <p:sldId id="363" r:id="rId20"/>
-    <p:sldId id="342" r:id="rId21"/>
-    <p:sldId id="365" r:id="rId22"/>
-    <p:sldId id="341" r:id="rId23"/>
-    <p:sldId id="366" r:id="rId24"/>
-    <p:sldId id="367" r:id="rId25"/>
-    <p:sldId id="368" r:id="rId26"/>
-    <p:sldId id="369" r:id="rId27"/>
-    <p:sldId id="372" r:id="rId28"/>
-    <p:sldId id="373" r:id="rId29"/>
-    <p:sldId id="370" r:id="rId30"/>
-    <p:sldId id="346" r:id="rId31"/>
-    <p:sldId id="359" r:id="rId32"/>
-    <p:sldId id="371" r:id="rId33"/>
-    <p:sldId id="360" r:id="rId34"/>
-    <p:sldId id="345" r:id="rId35"/>
-    <p:sldId id="361" r:id="rId36"/>
-    <p:sldId id="364" r:id="rId37"/>
-    <p:sldId id="333" r:id="rId38"/>
-    <p:sldId id="323" r:id="rId39"/>
-    <p:sldId id="334" r:id="rId40"/>
-    <p:sldId id="374" r:id="rId41"/>
-    <p:sldId id="375" r:id="rId42"/>
-    <p:sldId id="337" r:id="rId43"/>
-    <p:sldId id="309" r:id="rId44"/>
+    <p:sldId id="256" r:id="rId5"/>
+    <p:sldId id="291" r:id="rId6"/>
+    <p:sldId id="340" r:id="rId7"/>
+    <p:sldId id="344" r:id="rId8"/>
+    <p:sldId id="350" r:id="rId9"/>
+    <p:sldId id="351" r:id="rId10"/>
+    <p:sldId id="352" r:id="rId11"/>
+    <p:sldId id="353" r:id="rId12"/>
+    <p:sldId id="354" r:id="rId13"/>
+    <p:sldId id="355" r:id="rId14"/>
+    <p:sldId id="356" r:id="rId15"/>
+    <p:sldId id="357" r:id="rId16"/>
+    <p:sldId id="358" r:id="rId17"/>
+    <p:sldId id="343" r:id="rId18"/>
+    <p:sldId id="362" r:id="rId19"/>
+    <p:sldId id="347" r:id="rId20"/>
+    <p:sldId id="348" r:id="rId21"/>
+    <p:sldId id="349" r:id="rId22"/>
+    <p:sldId id="363" r:id="rId23"/>
+    <p:sldId id="342" r:id="rId24"/>
+    <p:sldId id="365" r:id="rId25"/>
+    <p:sldId id="341" r:id="rId26"/>
+    <p:sldId id="366" r:id="rId27"/>
+    <p:sldId id="367" r:id="rId28"/>
+    <p:sldId id="368" r:id="rId29"/>
+    <p:sldId id="369" r:id="rId30"/>
+    <p:sldId id="372" r:id="rId31"/>
+    <p:sldId id="373" r:id="rId32"/>
+    <p:sldId id="370" r:id="rId33"/>
+    <p:sldId id="346" r:id="rId34"/>
+    <p:sldId id="359" r:id="rId35"/>
+    <p:sldId id="371" r:id="rId36"/>
+    <p:sldId id="360" r:id="rId37"/>
+    <p:sldId id="345" r:id="rId38"/>
+    <p:sldId id="361" r:id="rId39"/>
+    <p:sldId id="364" r:id="rId40"/>
+    <p:sldId id="333" r:id="rId41"/>
+    <p:sldId id="323" r:id="rId42"/>
+    <p:sldId id="334" r:id="rId43"/>
+    <p:sldId id="374" r:id="rId44"/>
+    <p:sldId id="375" r:id="rId45"/>
+    <p:sldId id="337" r:id="rId46"/>
+    <p:sldId id="309" r:id="rId47"/>
   </p:sldIdLst>
   <p:sldSz cx="9144000" cy="5143500" type="screen16x9"/>
   <p:notesSz cx="6858000" cy="9144000"/>
@@ -10702,20 +10702,12 @@
               <a:t>	</a:t>
             </a:r>
             <a:r>
-              <a:rPr lang="pt-BR" sz="3600" b="1">
+              <a:rPr lang="pt-BR" sz="3600" b="1" dirty="0">
                 <a:solidFill>
                   <a:schemeClr val="bg1"/>
                 </a:solidFill>
               </a:rPr>
-              <a:t>Periféricos – </a:t>
-            </a:r>
-            <a:r>
-              <a:rPr lang="pt-BR" sz="3600" b="1" dirty="0">
-                <a:solidFill>
-                  <a:schemeClr val="bg1"/>
-                </a:solidFill>
-              </a:rPr>
-              <a:t>Sensores e Atuadores</a:t>
+              <a:t>Periféricos Externos – Sensores e Atuadores</a:t>
             </a:r>
           </a:p>
         </p:txBody>
@@ -19107,20 +19099,19 @@
             <a:pPr marL="0" indent="0" algn="just">
               <a:buNone/>
             </a:pPr>
-            <a:endParaRPr lang="pt-BR" sz="1800" dirty="0">
-              <a:latin typeface="Calibri" panose="020F0502020204030204" pitchFamily="34" charset="0"/>
-            </a:endParaRPr>
-          </a:p>
-          <a:p>
-            <a:pPr marL="0" indent="0" algn="just">
-              <a:buNone/>
-            </a:pPr>
+            <a:r>
+              <a:rPr lang="pt-BR" sz="1800">
+                <a:latin typeface="Times New Roman" panose="02020603050405020304" pitchFamily="18" charset="0"/>
+                <a:cs typeface="Times New Roman" panose="02020603050405020304" pitchFamily="18" charset="0"/>
+              </a:rPr>
+              <a:t>[</a:t>
+            </a:r>
             <a:r>
               <a:rPr lang="pt-BR" sz="1800" dirty="0">
                 <a:latin typeface="Times New Roman" panose="02020603050405020304" pitchFamily="18" charset="0"/>
                 <a:cs typeface="Times New Roman" panose="02020603050405020304" pitchFamily="18" charset="0"/>
               </a:rPr>
-              <a:t>[3] </a:t>
+              <a:t>3] </a:t>
             </a:r>
             <a:r>
               <a:rPr lang="pt-BR" sz="1800" b="1" dirty="0">
@@ -23713,4 +23704,239 @@
     </a:ext>
   </a:extLst>
 </a:theme>
+</file>
+
+<file path=customXml/item1.xml><?xml version="1.0" encoding="utf-8"?>
+<p:properties xmlns:p="http://schemas.microsoft.com/office/2006/metadata/properties" xmlns:xsi="http://www.w3.org/2001/XMLSchema-instance" xmlns:pc="http://schemas.microsoft.com/office/infopath/2007/PartnerControls">
+  <documentManagement>
+    <lcf76f155ced4ddcb4097134ff3c332f xmlns="98e1e31b-e8bc-4a9d-b016-a7aee7f17869">
+      <Terms xmlns="http://schemas.microsoft.com/office/infopath/2007/PartnerControls"/>
+    </lcf76f155ced4ddcb4097134ff3c332f>
+    <TaxCatchAll xmlns="f8145f89-92d2-4d37-8709-42472031a4ea" xsi:nil="true"/>
+  </documentManagement>
+</p:properties>
+</file>
+
+<file path=customXml/item2.xml><?xml version="1.0" encoding="utf-8"?>
+<?mso-contentType ?>
+<FormTemplates xmlns="http://schemas.microsoft.com/sharepoint/v3/contenttype/forms">
+  <Display>DocumentLibraryForm</Display>
+  <Edit>DocumentLibraryForm</Edit>
+  <New>DocumentLibraryForm</New>
+</FormTemplates>
+</file>
+
+<file path=customXml/item3.xml><?xml version="1.0" encoding="utf-8"?>
+<ct:contentTypeSchema xmlns:ct="http://schemas.microsoft.com/office/2006/metadata/contentType" xmlns:ma="http://schemas.microsoft.com/office/2006/metadata/properties/metaAttributes" ct:_="" ma:_="" ma:contentTypeName="Documento" ma:contentTypeID="0x010100A46819EDA44A43419A206A64A233AFA3" ma:contentTypeVersion="8" ma:contentTypeDescription="Crie um novo documento." ma:contentTypeScope="" ma:versionID="f7c45d3b59371912a69d3a72ba41e684">
+  <xsd:schema xmlns:xsd="http://www.w3.org/2001/XMLSchema" xmlns:xs="http://www.w3.org/2001/XMLSchema" xmlns:p="http://schemas.microsoft.com/office/2006/metadata/properties" xmlns:ns2="98e1e31b-e8bc-4a9d-b016-a7aee7f17869" xmlns:ns3="f8145f89-92d2-4d37-8709-42472031a4ea" targetNamespace="http://schemas.microsoft.com/office/2006/metadata/properties" ma:root="true" ma:fieldsID="3b09216253706be607b6d048608cd832" ns2:_="" ns3:_="">
+    <xsd:import namespace="98e1e31b-e8bc-4a9d-b016-a7aee7f17869"/>
+    <xsd:import namespace="f8145f89-92d2-4d37-8709-42472031a4ea"/>
+    <xsd:element name="properties">
+      <xsd:complexType>
+        <xsd:sequence>
+          <xsd:element name="documentManagement">
+            <xsd:complexType>
+              <xsd:all>
+                <xsd:element ref="ns2:MediaServiceMetadata" minOccurs="0"/>
+                <xsd:element ref="ns2:MediaServiceFastMetadata" minOccurs="0"/>
+                <xsd:element ref="ns2:lcf76f155ced4ddcb4097134ff3c332f" minOccurs="0"/>
+                <xsd:element ref="ns3:TaxCatchAll" minOccurs="0"/>
+                <xsd:element ref="ns2:MediaServiceOCR" minOccurs="0"/>
+                <xsd:element ref="ns2:MediaServiceGenerationTime" minOccurs="0"/>
+                <xsd:element ref="ns2:MediaServiceEventHashCode" minOccurs="0"/>
+              </xsd:all>
+            </xsd:complexType>
+          </xsd:element>
+        </xsd:sequence>
+      </xsd:complexType>
+    </xsd:element>
+  </xsd:schema>
+  <xsd:schema xmlns:xsd="http://www.w3.org/2001/XMLSchema" xmlns:xs="http://www.w3.org/2001/XMLSchema" xmlns:dms="http://schemas.microsoft.com/office/2006/documentManagement/types" xmlns:pc="http://schemas.microsoft.com/office/infopath/2007/PartnerControls" targetNamespace="98e1e31b-e8bc-4a9d-b016-a7aee7f17869" elementFormDefault="qualified">
+    <xsd:import namespace="http://schemas.microsoft.com/office/2006/documentManagement/types"/>
+    <xsd:import namespace="http://schemas.microsoft.com/office/infopath/2007/PartnerControls"/>
+    <xsd:element name="MediaServiceMetadata" ma:index="8" nillable="true" ma:displayName="MediaServiceMetadata" ma:hidden="true" ma:internalName="MediaServiceMetadata" ma:readOnly="true">
+      <xsd:simpleType>
+        <xsd:restriction base="dms:Note"/>
+      </xsd:simpleType>
+    </xsd:element>
+    <xsd:element name="MediaServiceFastMetadata" ma:index="9" nillable="true" ma:displayName="MediaServiceFastMetadata" ma:hidden="true" ma:internalName="MediaServiceFastMetadata" ma:readOnly="true">
+      <xsd:simpleType>
+        <xsd:restriction base="dms:Note"/>
+      </xsd:simpleType>
+    </xsd:element>
+    <xsd:element name="lcf76f155ced4ddcb4097134ff3c332f" ma:index="11" nillable="true" ma:taxonomy="true" ma:internalName="lcf76f155ced4ddcb4097134ff3c332f" ma:taxonomyFieldName="MediaServiceImageTags" ma:displayName="Marcações de imagem" ma:readOnly="false" ma:fieldId="{5cf76f15-5ced-4ddc-b409-7134ff3c332f}" ma:taxonomyMulti="true" ma:sspId="97775bfb-6ca5-4830-96af-bb76916be114" ma:termSetId="09814cd3-568e-fe90-9814-8d621ff8fb84" ma:anchorId="fba54fb3-c3e1-fe81-a776-ca4b69148c4d" ma:open="true" ma:isKeyword="false">
+      <xsd:complexType>
+        <xsd:sequence>
+          <xsd:element ref="pc:Terms" minOccurs="0" maxOccurs="1"/>
+        </xsd:sequence>
+      </xsd:complexType>
+    </xsd:element>
+    <xsd:element name="MediaServiceOCR" ma:index="13" nillable="true" ma:displayName="Extracted Text" ma:internalName="MediaServiceOCR" ma:readOnly="true">
+      <xsd:simpleType>
+        <xsd:restriction base="dms:Note">
+          <xsd:maxLength value="255"/>
+        </xsd:restriction>
+      </xsd:simpleType>
+    </xsd:element>
+    <xsd:element name="MediaServiceGenerationTime" ma:index="14" nillable="true" ma:displayName="MediaServiceGenerationTime" ma:hidden="true" ma:internalName="MediaServiceGenerationTime" ma:readOnly="true">
+      <xsd:simpleType>
+        <xsd:restriction base="dms:Text"/>
+      </xsd:simpleType>
+    </xsd:element>
+    <xsd:element name="MediaServiceEventHashCode" ma:index="15" nillable="true" ma:displayName="MediaServiceEventHashCode" ma:hidden="true" ma:internalName="MediaServiceEventHashCode" ma:readOnly="true">
+      <xsd:simpleType>
+        <xsd:restriction base="dms:Text"/>
+      </xsd:simpleType>
+    </xsd:element>
+  </xsd:schema>
+  <xsd:schema xmlns:xsd="http://www.w3.org/2001/XMLSchema" xmlns:xs="http://www.w3.org/2001/XMLSchema" xmlns:dms="http://schemas.microsoft.com/office/2006/documentManagement/types" xmlns:pc="http://schemas.microsoft.com/office/infopath/2007/PartnerControls" targetNamespace="f8145f89-92d2-4d37-8709-42472031a4ea" elementFormDefault="qualified">
+    <xsd:import namespace="http://schemas.microsoft.com/office/2006/documentManagement/types"/>
+    <xsd:import namespace="http://schemas.microsoft.com/office/infopath/2007/PartnerControls"/>
+    <xsd:element name="TaxCatchAll" ma:index="12" nillable="true" ma:displayName="Taxonomy Catch All Column" ma:hidden="true" ma:list="{6f8f585a-9363-4b78-b8d1-9e374055f1d0}" ma:internalName="TaxCatchAll" ma:showField="CatchAllData" ma:web="f8145f89-92d2-4d37-8709-42472031a4ea">
+      <xsd:complexType>
+        <xsd:complexContent>
+          <xsd:extension base="dms:MultiChoiceLookup">
+            <xsd:sequence>
+              <xsd:element name="Value" type="dms:Lookup" maxOccurs="unbounded" minOccurs="0" nillable="true"/>
+            </xsd:sequence>
+          </xsd:extension>
+        </xsd:complexContent>
+      </xsd:complexType>
+    </xsd:element>
+  </xsd:schema>
+  <xsd:schema xmlns="http://schemas.openxmlformats.org/package/2006/metadata/core-properties" xmlns:xsd="http://www.w3.org/2001/XMLSchema" xmlns:xsi="http://www.w3.org/2001/XMLSchema-instance" xmlns:dc="http://purl.org/dc/elements/1.1/" xmlns:dcterms="http://purl.org/dc/terms/" xmlns:odoc="http://schemas.microsoft.com/internal/obd" targetNamespace="http://schemas.openxmlformats.org/package/2006/metadata/core-properties" elementFormDefault="qualified" attributeFormDefault="unqualified" blockDefault="#all">
+    <xsd:import namespace="http://purl.org/dc/elements/1.1/" schemaLocation="http://dublincore.org/schemas/xmls/qdc/2003/04/02/dc.xsd"/>
+    <xsd:import namespace="http://purl.org/dc/terms/" schemaLocation="http://dublincore.org/schemas/xmls/qdc/2003/04/02/dcterms.xsd"/>
+    <xsd:element name="coreProperties" type="CT_coreProperties"/>
+    <xsd:complexType name="CT_coreProperties">
+      <xsd:all>
+        <xsd:element ref="dc:creator" minOccurs="0" maxOccurs="1"/>
+        <xsd:element ref="dcterms:created" minOccurs="0" maxOccurs="1"/>
+        <xsd:element ref="dc:identifier" minOccurs="0" maxOccurs="1"/>
+        <xsd:element name="contentType" minOccurs="0" maxOccurs="1" type="xsd:string" ma:index="0" ma:displayName="Tipo de Conteúdo"/>
+        <xsd:element ref="dc:title" minOccurs="0" maxOccurs="1" ma:index="4" ma:displayName="Título"/>
+        <xsd:element ref="dc:subject" minOccurs="0" maxOccurs="1"/>
+        <xsd:element ref="dc:description" minOccurs="0" maxOccurs="1"/>
+        <xsd:element name="keywords" minOccurs="0" maxOccurs="1" type="xsd:string"/>
+        <xsd:element ref="dc:language" minOccurs="0" maxOccurs="1"/>
+        <xsd:element name="category" minOccurs="0" maxOccurs="1" type="xsd:string"/>
+        <xsd:element name="version" minOccurs="0" maxOccurs="1" type="xsd:string"/>
+        <xsd:element name="revision" minOccurs="0" maxOccurs="1" type="xsd:string">
+          <xsd:annotation>
+            <xsd:documentation>
+                        This value indicates the number of saves or revisions. The application is responsible for updating this value after each revision.
+                    </xsd:documentation>
+          </xsd:annotation>
+        </xsd:element>
+        <xsd:element name="lastModifiedBy" minOccurs="0" maxOccurs="1" type="xsd:string"/>
+        <xsd:element ref="dcterms:modified" minOccurs="0" maxOccurs="1"/>
+        <xsd:element name="contentStatus" minOccurs="0" maxOccurs="1" type="xsd:string"/>
+      </xsd:all>
+    </xsd:complexType>
+  </xsd:schema>
+  <xs:schema xmlns:pc="http://schemas.microsoft.com/office/infopath/2007/PartnerControls" xmlns:xs="http://www.w3.org/2001/XMLSchema" targetNamespace="http://schemas.microsoft.com/office/infopath/2007/PartnerControls" elementFormDefault="qualified" attributeFormDefault="unqualified">
+    <xs:element name="Person">
+      <xs:complexType>
+        <xs:sequence>
+          <xs:element ref="pc:DisplayName" minOccurs="0"/>
+          <xs:element ref="pc:AccountId" minOccurs="0"/>
+          <xs:element ref="pc:AccountType" minOccurs="0"/>
+        </xs:sequence>
+      </xs:complexType>
+    </xs:element>
+    <xs:element name="DisplayName" type="xs:string"/>
+    <xs:element name="AccountId" type="xs:string"/>
+    <xs:element name="AccountType" type="xs:string"/>
+    <xs:element name="BDCAssociatedEntity">
+      <xs:complexType>
+        <xs:sequence>
+          <xs:element ref="pc:BDCEntity" minOccurs="0" maxOccurs="unbounded"/>
+        </xs:sequence>
+        <xs:attribute ref="pc:EntityNamespace"/>
+        <xs:attribute ref="pc:EntityName"/>
+        <xs:attribute ref="pc:SystemInstanceName"/>
+        <xs:attribute ref="pc:AssociationName"/>
+      </xs:complexType>
+    </xs:element>
+    <xs:attribute name="EntityNamespace" type="xs:string"/>
+    <xs:attribute name="EntityName" type="xs:string"/>
+    <xs:attribute name="SystemInstanceName" type="xs:string"/>
+    <xs:attribute name="AssociationName" type="xs:string"/>
+    <xs:element name="BDCEntity">
+      <xs:complexType>
+        <xs:sequence>
+          <xs:element ref="pc:EntityDisplayName" minOccurs="0"/>
+          <xs:element ref="pc:EntityInstanceReference" minOccurs="0"/>
+          <xs:element ref="pc:EntityId1" minOccurs="0"/>
+          <xs:element ref="pc:EntityId2" minOccurs="0"/>
+          <xs:element ref="pc:EntityId3" minOccurs="0"/>
+          <xs:element ref="pc:EntityId4" minOccurs="0"/>
+          <xs:element ref="pc:EntityId5" minOccurs="0"/>
+        </xs:sequence>
+      </xs:complexType>
+    </xs:element>
+    <xs:element name="EntityDisplayName" type="xs:string"/>
+    <xs:element name="EntityInstanceReference" type="xs:string"/>
+    <xs:element name="EntityId1" type="xs:string"/>
+    <xs:element name="EntityId2" type="xs:string"/>
+    <xs:element name="EntityId3" type="xs:string"/>
+    <xs:element name="EntityId4" type="xs:string"/>
+    <xs:element name="EntityId5" type="xs:string"/>
+    <xs:element name="Terms">
+      <xs:complexType>
+        <xs:sequence>
+          <xs:element ref="pc:TermInfo" minOccurs="0" maxOccurs="unbounded"/>
+        </xs:sequence>
+      </xs:complexType>
+    </xs:element>
+    <xs:element name="TermInfo">
+      <xs:complexType>
+        <xs:sequence>
+          <xs:element ref="pc:TermName" minOccurs="0"/>
+          <xs:element ref="pc:TermId" minOccurs="0"/>
+        </xs:sequence>
+      </xs:complexType>
+    </xs:element>
+    <xs:element name="TermName" type="xs:string"/>
+    <xs:element name="TermId" type="xs:string"/>
+  </xs:schema>
+</ct:contentTypeSchema>
+</file>
+
+<file path=customXml/itemProps1.xml><?xml version="1.0" encoding="utf-8"?>
+<ds:datastoreItem xmlns:ds="http://schemas.openxmlformats.org/officeDocument/2006/customXml" ds:itemID="{EE685939-BA00-463B-B483-6768DB1E360A}">
+  <ds:schemaRefs>
+    <ds:schemaRef ds:uri="http://schemas.microsoft.com/office/2006/metadata/properties"/>
+    <ds:schemaRef ds:uri="http://schemas.microsoft.com/office/infopath/2007/PartnerControls"/>
+    <ds:schemaRef ds:uri="98e1e31b-e8bc-4a9d-b016-a7aee7f17869"/>
+    <ds:schemaRef ds:uri="f8145f89-92d2-4d37-8709-42472031a4ea"/>
+  </ds:schemaRefs>
+</ds:datastoreItem>
+</file>
+
+<file path=customXml/itemProps2.xml><?xml version="1.0" encoding="utf-8"?>
+<ds:datastoreItem xmlns:ds="http://schemas.openxmlformats.org/officeDocument/2006/customXml" ds:itemID="{5F0CEC26-894B-4934-8E23-82943FCD068E}">
+  <ds:schemaRefs>
+    <ds:schemaRef ds:uri="http://schemas.microsoft.com/sharepoint/v3/contenttype/forms"/>
+  </ds:schemaRefs>
+</ds:datastoreItem>
+</file>
+
+<file path=customXml/itemProps3.xml><?xml version="1.0" encoding="utf-8"?>
+<ds:datastoreItem xmlns:ds="http://schemas.openxmlformats.org/officeDocument/2006/customXml" ds:itemID="{E4C5C26F-B92B-49ED-9DB4-C5422A960E48}">
+  <ds:schemaRefs>
+    <ds:schemaRef ds:uri="http://schemas.microsoft.com/office/2006/metadata/contentType"/>
+    <ds:schemaRef ds:uri="http://schemas.microsoft.com/office/2006/metadata/properties/metaAttributes"/>
+    <ds:schemaRef ds:uri="http://www.w3.org/2001/XMLSchema"/>
+    <ds:schemaRef ds:uri="http://schemas.microsoft.com/office/2006/metadata/properties"/>
+    <ds:schemaRef ds:uri="98e1e31b-e8bc-4a9d-b016-a7aee7f17869"/>
+    <ds:schemaRef ds:uri="f8145f89-92d2-4d37-8709-42472031a4ea"/>
+    <ds:schemaRef ds:uri="http://schemas.microsoft.com/office/2006/documentManagement/types"/>
+    <ds:schemaRef ds:uri="http://schemas.microsoft.com/office/infopath/2007/PartnerControls"/>
+    <ds:schemaRef ds:uri="http://schemas.openxmlformats.org/package/2006/metadata/core-properties"/>
+    <ds:schemaRef ds:uri="http://purl.org/dc/elements/1.1/"/>
+    <ds:schemaRef ds:uri="http://purl.org/dc/terms/"/>
+    <ds:schemaRef ds:uri="http://schemas.microsoft.com/internal/obd"/>
+  </ds:schemaRefs>
+</ds:datastoreItem>
 </file>
</xml_diff>

<commit_message>
Micro .... - 09Mai2025
</commit_message>
<xml_diff>
--- a/01 Classes/Aula 07 - Programação Microcontroladores - Periféricos Externos- Protocolos Sensores e Atuadores.pptx
+++ b/01 Classes/Aula 07 - Programação Microcontroladores - Periféricos Externos- Protocolos Sensores e Atuadores.pptx
@@ -10808,7 +10808,23 @@
                   <a:schemeClr val="bg1"/>
                 </a:solidFill>
               </a:rPr>
-              <a:t>Periféricos Externos – Sensores e Atuadores</a:t>
+              <a:t>Protocolos </a:t>
+            </a:r>
+            <a:r>
+              <a:rPr lang="pt-BR" sz="3600" b="1">
+                <a:solidFill>
+                  <a:schemeClr val="bg1"/>
+                </a:solidFill>
+              </a:rPr>
+              <a:t>de Comunicação </a:t>
+            </a:r>
+            <a:r>
+              <a:rPr lang="pt-BR" sz="3600" b="1" dirty="0">
+                <a:solidFill>
+                  <a:schemeClr val="bg1"/>
+                </a:solidFill>
+              </a:rPr>
+              <a:t>e Periféricos Externos – Sensores e Atuadores</a:t>
             </a:r>
           </a:p>
         </p:txBody>
@@ -24215,6 +24231,26 @@
 </file>
 
 <file path=customXml/item1.xml><?xml version="1.0" encoding="utf-8"?>
+<p:properties xmlns:p="http://schemas.microsoft.com/office/2006/metadata/properties" xmlns:xsi="http://www.w3.org/2001/XMLSchema-instance" xmlns:pc="http://schemas.microsoft.com/office/infopath/2007/PartnerControls">
+  <documentManagement>
+    <lcf76f155ced4ddcb4097134ff3c332f xmlns="98e1e31b-e8bc-4a9d-b016-a7aee7f17869">
+      <Terms xmlns="http://schemas.microsoft.com/office/infopath/2007/PartnerControls"/>
+    </lcf76f155ced4ddcb4097134ff3c332f>
+    <TaxCatchAll xmlns="f8145f89-92d2-4d37-8709-42472031a4ea" xsi:nil="true"/>
+  </documentManagement>
+</p:properties>
+</file>
+
+<file path=customXml/item2.xml><?xml version="1.0" encoding="utf-8"?>
+<?mso-contentType ?>
+<FormTemplates xmlns="http://schemas.microsoft.com/sharepoint/v3/contenttype/forms">
+  <Display>DocumentLibraryForm</Display>
+  <Edit>DocumentLibraryForm</Edit>
+  <New>DocumentLibraryForm</New>
+</FormTemplates>
+</file>
+
+<file path=customXml/item3.xml><?xml version="1.0" encoding="utf-8"?>
 <ct:contentTypeSchema xmlns:ct="http://schemas.microsoft.com/office/2006/metadata/contentType" xmlns:ma="http://schemas.microsoft.com/office/2006/metadata/properties/metaAttributes" ct:_="" ma:_="" ma:contentTypeName="Documento" ma:contentTypeID="0x010100A46819EDA44A43419A206A64A233AFA3" ma:contentTypeVersion="8" ma:contentTypeDescription="Crie um novo documento." ma:contentTypeScope="" ma:versionID="f7c45d3b59371912a69d3a72ba41e684">
   <xsd:schema xmlns:xsd="http://www.w3.org/2001/XMLSchema" xmlns:xs="http://www.w3.org/2001/XMLSchema" xmlns:p="http://schemas.microsoft.com/office/2006/metadata/properties" xmlns:ns2="98e1e31b-e8bc-4a9d-b016-a7aee7f17869" xmlns:ns3="f8145f89-92d2-4d37-8709-42472031a4ea" targetNamespace="http://schemas.microsoft.com/office/2006/metadata/properties" ma:root="true" ma:fieldsID="3b09216253706be607b6d048608cd832" ns2:_="" ns3:_="">
     <xsd:import namespace="98e1e31b-e8bc-4a9d-b016-a7aee7f17869"/>
@@ -24391,27 +24427,26 @@
 </ct:contentTypeSchema>
 </file>
 
-<file path=customXml/item2.xml><?xml version="1.0" encoding="utf-8"?>
-<p:properties xmlns:p="http://schemas.microsoft.com/office/2006/metadata/properties" xmlns:xsi="http://www.w3.org/2001/XMLSchema-instance" xmlns:pc="http://schemas.microsoft.com/office/infopath/2007/PartnerControls">
-  <documentManagement>
-    <lcf76f155ced4ddcb4097134ff3c332f xmlns="98e1e31b-e8bc-4a9d-b016-a7aee7f17869">
-      <Terms xmlns="http://schemas.microsoft.com/office/infopath/2007/PartnerControls"/>
-    </lcf76f155ced4ddcb4097134ff3c332f>
-    <TaxCatchAll xmlns="f8145f89-92d2-4d37-8709-42472031a4ea" xsi:nil="true"/>
-  </documentManagement>
-</p:properties>
+<file path=customXml/itemProps1.xml><?xml version="1.0" encoding="utf-8"?>
+<ds:datastoreItem xmlns:ds="http://schemas.openxmlformats.org/officeDocument/2006/customXml" ds:itemID="{EE685939-BA00-463B-B483-6768DB1E360A}">
+  <ds:schemaRefs>
+    <ds:schemaRef ds:uri="http://schemas.microsoft.com/office/2006/metadata/properties"/>
+    <ds:schemaRef ds:uri="http://schemas.microsoft.com/office/infopath/2007/PartnerControls"/>
+    <ds:schemaRef ds:uri="98e1e31b-e8bc-4a9d-b016-a7aee7f17869"/>
+    <ds:schemaRef ds:uri="f8145f89-92d2-4d37-8709-42472031a4ea"/>
+  </ds:schemaRefs>
+</ds:datastoreItem>
 </file>
 
-<file path=customXml/item3.xml><?xml version="1.0" encoding="utf-8"?>
-<?mso-contentType ?>
-<FormTemplates xmlns="http://schemas.microsoft.com/sharepoint/v3/contenttype/forms">
-  <Display>DocumentLibraryForm</Display>
-  <Edit>DocumentLibraryForm</Edit>
-  <New>DocumentLibraryForm</New>
-</FormTemplates>
+<file path=customXml/itemProps2.xml><?xml version="1.0" encoding="utf-8"?>
+<ds:datastoreItem xmlns:ds="http://schemas.openxmlformats.org/officeDocument/2006/customXml" ds:itemID="{5F0CEC26-894B-4934-8E23-82943FCD068E}">
+  <ds:schemaRefs>
+    <ds:schemaRef ds:uri="http://schemas.microsoft.com/sharepoint/v3/contenttype/forms"/>
+  </ds:schemaRefs>
+</ds:datastoreItem>
 </file>
 
-<file path=customXml/itemProps1.xml><?xml version="1.0" encoding="utf-8"?>
+<file path=customXml/itemProps3.xml><?xml version="1.0" encoding="utf-8"?>
 <ds:datastoreItem xmlns:ds="http://schemas.openxmlformats.org/officeDocument/2006/customXml" ds:itemID="{E4C5C26F-B92B-49ED-9DB4-C5422A960E48}">
   <ds:schemaRefs>
     <ds:schemaRef ds:uri="http://schemas.microsoft.com/office/2006/metadata/contentType"/>
@@ -24428,23 +24463,4 @@
     <ds:schemaRef ds:uri="http://schemas.microsoft.com/internal/obd"/>
   </ds:schemaRefs>
 </ds:datastoreItem>
-</file>
-
-<file path=customXml/itemProps2.xml><?xml version="1.0" encoding="utf-8"?>
-<ds:datastoreItem xmlns:ds="http://schemas.openxmlformats.org/officeDocument/2006/customXml" ds:itemID="{EE685939-BA00-463B-B483-6768DB1E360A}">
-  <ds:schemaRefs>
-    <ds:schemaRef ds:uri="http://schemas.microsoft.com/office/2006/metadata/properties"/>
-    <ds:schemaRef ds:uri="http://schemas.microsoft.com/office/infopath/2007/PartnerControls"/>
-    <ds:schemaRef ds:uri="98e1e31b-e8bc-4a9d-b016-a7aee7f17869"/>
-    <ds:schemaRef ds:uri="f8145f89-92d2-4d37-8709-42472031a4ea"/>
-  </ds:schemaRefs>
-</ds:datastoreItem>
-</file>
-
-<file path=customXml/itemProps3.xml><?xml version="1.0" encoding="utf-8"?>
-<ds:datastoreItem xmlns:ds="http://schemas.openxmlformats.org/officeDocument/2006/customXml" ds:itemID="{5F0CEC26-894B-4934-8E23-82943FCD068E}">
-  <ds:schemaRefs>
-    <ds:schemaRef ds:uri="http://schemas.microsoft.com/sharepoint/v3/contenttype/forms"/>
-  </ds:schemaRefs>
-</ds:datastoreItem>
 </file>
</xml_diff>